<commit_message>
Update prezentace - asi final verze
</commit_message>
<xml_diff>
--- a/Prezentace_pujcovna_aut.pptx
+++ b/Prezentace_pujcovna_aut.pptx
@@ -5,10 +5,10 @@
     <p:sldMasterId id="2147483648" r:id="rId4"/>
   </p:sldMasterIdLst>
   <p:notesMasterIdLst>
-    <p:notesMasterId r:id="rId15"/>
+    <p:notesMasterId r:id="rId18"/>
   </p:notesMasterIdLst>
   <p:handoutMasterIdLst>
-    <p:handoutMasterId r:id="rId16"/>
+    <p:handoutMasterId r:id="rId19"/>
   </p:handoutMasterIdLst>
   <p:sldIdLst>
     <p:sldId id="261" r:id="rId5"/>
@@ -17,10 +17,13 @@
     <p:sldId id="264" r:id="rId8"/>
     <p:sldId id="269" r:id="rId9"/>
     <p:sldId id="270" r:id="rId10"/>
-    <p:sldId id="265" r:id="rId11"/>
-    <p:sldId id="266" r:id="rId12"/>
-    <p:sldId id="267" r:id="rId13"/>
-    <p:sldId id="268" r:id="rId14"/>
+    <p:sldId id="272" r:id="rId11"/>
+    <p:sldId id="273" r:id="rId12"/>
+    <p:sldId id="265" r:id="rId13"/>
+    <p:sldId id="266" r:id="rId14"/>
+    <p:sldId id="267" r:id="rId15"/>
+    <p:sldId id="268" r:id="rId16"/>
+    <p:sldId id="271" r:id="rId17"/>
   </p:sldIdLst>
   <p:sldSz cx="12192000" cy="6858000"/>
   <p:notesSz cx="6858000" cy="9144000"/>
@@ -214,7 +217,7 @@
             <a:pPr rtl="0"/>
             <a:fld id="{A5E6EEE9-13F6-40ED-914F-030423CFA684}" type="datetime1">
               <a:rPr lang="cs-CZ" smtClean="0"/>
-              <a:t>26.04.2024</a:t>
+              <a:t>28.04.2024</a:t>
             </a:fld>
             <a:endParaRPr lang="cs-CZ" dirty="0"/>
           </a:p>
@@ -383,7 +386,7 @@
             <a:fld id="{1708A0FF-EF07-4E0E-80BD-A4A950917DEB}" type="datetime1">
               <a:rPr lang="cs-CZ" smtClean="0"/>
               <a:pPr/>
-              <a:t>26.04.2024</a:t>
+              <a:t>28.04.2024</a:t>
             </a:fld>
             <a:endParaRPr lang="cs-CZ" dirty="0"/>
           </a:p>
@@ -1158,7 +1161,7 @@
             <a:pPr rtl="0"/>
             <a:fld id="{60F3FC76-B9E1-4B0A-AC92-D5FDAC06C9CA}" type="datetime1">
               <a:rPr lang="cs-CZ" noProof="0" smtClean="0"/>
-              <a:t>26.04.2024</a:t>
+              <a:t>28.04.2024</a:t>
             </a:fld>
             <a:endParaRPr lang="cs-CZ" noProof="0" dirty="0"/>
           </a:p>
@@ -1455,7 +1458,7 @@
             <a:pPr rtl="0"/>
             <a:fld id="{3BE82174-4561-41EA-9F02-4C3DCC697793}" type="datetime1">
               <a:rPr lang="cs-CZ" noProof="0" smtClean="0"/>
-              <a:t>26.04.2024</a:t>
+              <a:t>28.04.2024</a:t>
             </a:fld>
             <a:endParaRPr lang="cs-CZ" noProof="0" dirty="0"/>
           </a:p>
@@ -1703,7 +1706,7 @@
             <a:pPr rtl="0"/>
             <a:fld id="{02F763C4-2CC7-4BB9-B410-F74C43A891C4}" type="datetime1">
               <a:rPr lang="cs-CZ" noProof="0" smtClean="0"/>
-              <a:t>26.04.2024</a:t>
+              <a:t>28.04.2024</a:t>
             </a:fld>
             <a:endParaRPr lang="cs-CZ" noProof="0" dirty="0"/>
           </a:p>
@@ -2243,7 +2246,7 @@
             <a:pPr rtl="0"/>
             <a:fld id="{417BE2A6-7865-412C-8B83-A45417093147}" type="datetime1">
               <a:rPr lang="cs-CZ" noProof="0" smtClean="0"/>
-              <a:t>26.04.2024</a:t>
+              <a:t>28.04.2024</a:t>
             </a:fld>
             <a:endParaRPr lang="cs-CZ" noProof="0" dirty="0"/>
           </a:p>
@@ -2491,7 +2494,7 @@
             <a:pPr rtl="0"/>
             <a:fld id="{674F72C5-9FCC-44D1-8204-7822C05A79D9}" type="datetime1">
               <a:rPr lang="cs-CZ" noProof="0" smtClean="0"/>
-              <a:t>26.04.2024</a:t>
+              <a:t>28.04.2024</a:t>
             </a:fld>
             <a:endParaRPr lang="cs-CZ" noProof="0" dirty="0"/>
           </a:p>
@@ -3023,7 +3026,7 @@
             <a:pPr rtl="0"/>
             <a:fld id="{0F962A8E-2547-4FC5-A954-A7F1F4C6C6EF}" type="datetime1">
               <a:rPr lang="cs-CZ" noProof="0" smtClean="0"/>
-              <a:t>26.04.2024</a:t>
+              <a:t>28.04.2024</a:t>
             </a:fld>
             <a:endParaRPr lang="cs-CZ" noProof="0" dirty="0"/>
           </a:p>
@@ -3319,7 +3322,7 @@
             <a:pPr rtl="0"/>
             <a:fld id="{36E159D8-4A5E-4758-BDBC-A0C764742BBD}" type="datetime1">
               <a:rPr lang="cs-CZ" noProof="0" smtClean="0"/>
-              <a:t>26.04.2024</a:t>
+              <a:t>28.04.2024</a:t>
             </a:fld>
             <a:endParaRPr lang="cs-CZ" noProof="0" dirty="0"/>
           </a:p>
@@ -3493,7 +3496,7 @@
             <a:pPr rtl="0"/>
             <a:fld id="{FCFABF75-0DF6-41ED-83BB-1ADC77868F9D}" type="datetime1">
               <a:rPr lang="cs-CZ" noProof="0" smtClean="0"/>
-              <a:t>26.04.2024</a:t>
+              <a:t>28.04.2024</a:t>
             </a:fld>
             <a:endParaRPr lang="cs-CZ" noProof="0" dirty="0"/>
           </a:p>
@@ -3673,7 +3676,7 @@
             <a:pPr rtl="0"/>
             <a:fld id="{25E4D6DA-0748-48AD-BB4E-D0899AC66DDA}" type="datetime1">
               <a:rPr lang="cs-CZ" noProof="0" smtClean="0"/>
-              <a:t>26.04.2024</a:t>
+              <a:t>28.04.2024</a:t>
             </a:fld>
             <a:endParaRPr lang="cs-CZ" noProof="0" dirty="0"/>
           </a:p>
@@ -3843,7 +3846,7 @@
             <a:pPr rtl="0"/>
             <a:fld id="{9CDE875C-2367-4FB8-881E-D8317E41B1EE}" type="datetime1">
               <a:rPr lang="cs-CZ" noProof="0" smtClean="0"/>
-              <a:t>26.04.2024</a:t>
+              <a:t>28.04.2024</a:t>
             </a:fld>
             <a:endParaRPr lang="cs-CZ" noProof="0" dirty="0"/>
           </a:p>
@@ -4094,7 +4097,7 @@
             <a:pPr rtl="0"/>
             <a:fld id="{55361CA0-66CA-4C74-89B9-9B9A6AE40107}" type="datetime1">
               <a:rPr lang="cs-CZ" noProof="0" smtClean="0"/>
-              <a:t>26.04.2024</a:t>
+              <a:t>28.04.2024</a:t>
             </a:fld>
             <a:endParaRPr lang="cs-CZ" noProof="0" dirty="0"/>
           </a:p>
@@ -4391,7 +4394,7 @@
             <a:pPr rtl="0"/>
             <a:fld id="{D21F0FDB-FA2C-43B4-A3A3-36EA1AD7695E}" type="datetime1">
               <a:rPr lang="cs-CZ" noProof="0" smtClean="0"/>
-              <a:t>26.04.2024</a:t>
+              <a:t>28.04.2024</a:t>
             </a:fld>
             <a:endParaRPr lang="cs-CZ" noProof="0" dirty="0"/>
           </a:p>
@@ -4833,7 +4836,7 @@
             <a:pPr rtl="0"/>
             <a:fld id="{0BDB886B-058A-4B28-8405-984F0FBA1A12}" type="datetime1">
               <a:rPr lang="cs-CZ" noProof="0" smtClean="0"/>
-              <a:t>26.04.2024</a:t>
+              <a:t>28.04.2024</a:t>
             </a:fld>
             <a:endParaRPr lang="cs-CZ" noProof="0" dirty="0"/>
           </a:p>
@@ -4951,7 +4954,7 @@
             <a:pPr rtl="0"/>
             <a:fld id="{755C478E-8365-451D-B5A1-381AC3D80635}" type="datetime1">
               <a:rPr lang="cs-CZ" noProof="0" smtClean="0"/>
-              <a:t>26.04.2024</a:t>
+              <a:t>28.04.2024</a:t>
             </a:fld>
             <a:endParaRPr lang="cs-CZ" noProof="0" dirty="0"/>
           </a:p>
@@ -5045,7 +5048,7 @@
             <a:pPr rtl="0"/>
             <a:fld id="{7157C8F2-BEDB-4EEA-8D43-FBCA00E261D0}" type="datetime1">
               <a:rPr lang="cs-CZ" noProof="0" smtClean="0"/>
-              <a:t>26.04.2024</a:t>
+              <a:t>28.04.2024</a:t>
             </a:fld>
             <a:endParaRPr lang="cs-CZ" noProof="0" dirty="0"/>
           </a:p>
@@ -5328,7 +5331,7 @@
             <a:pPr rtl="0"/>
             <a:fld id="{3D12E986-B109-4DC8-933F-F665794D144D}" type="datetime1">
               <a:rPr lang="cs-CZ" noProof="0" smtClean="0"/>
-              <a:t>26.04.2024</a:t>
+              <a:t>28.04.2024</a:t>
             </a:fld>
             <a:endParaRPr lang="cs-CZ" noProof="0" dirty="0"/>
           </a:p>
@@ -5620,7 +5623,7 @@
             <a:pPr rtl="0"/>
             <a:fld id="{87D1884C-521F-41E4-A3F5-52D84238A1BB}" type="datetime1">
               <a:rPr lang="cs-CZ" noProof="0" smtClean="0"/>
-              <a:t>26.04.2024</a:t>
+              <a:t>28.04.2024</a:t>
             </a:fld>
             <a:endParaRPr lang="cs-CZ" noProof="0" dirty="0"/>
           </a:p>
@@ -6148,7 +6151,7 @@
             <a:pPr rtl="0"/>
             <a:fld id="{B8C0DA42-23FD-4FA4-B9A5-AB0D779DB3E7}" type="datetime1">
               <a:rPr lang="cs-CZ" noProof="0" smtClean="0"/>
-              <a:t>26.04.2024</a:t>
+              <a:t>28.04.2024</a:t>
             </a:fld>
             <a:endParaRPr lang="cs-CZ" noProof="0" dirty="0"/>
           </a:p>
@@ -6782,38 +6785,124 @@
           <a:chExt cx="0" cy="0"/>
         </a:xfrm>
       </p:grpSpPr>
-      <p:sp>
-        <p:nvSpPr>
-          <p:cNvPr id="2" name="Nadpis 1">
+      <p:pic>
+        <p:nvPicPr>
+          <p:cNvPr id="5" name="Zástupný obsah 4" descr="Obsah obrázku text, diagram, Technický výkres, Plán&#10;&#10;Popis byl vytvořen automaticky">
             <a:extLst>
               <a:ext uri="{FF2B5EF4-FFF2-40B4-BE49-F238E27FC236}">
-                <a16:creationId xmlns:a16="http://schemas.microsoft.com/office/drawing/2014/main" id="{46FCB879-9394-44B7-DE18-6B16ADDB3AFC}"/>
+                <a16:creationId xmlns:a16="http://schemas.microsoft.com/office/drawing/2014/main" id="{71BAE5CC-93AA-38A0-3460-55DEC3747FE3}"/>
               </a:ext>
             </a:extLst>
           </p:cNvPr>
-          <p:cNvSpPr>
-            <a:spLocks noGrp="1"/>
-          </p:cNvSpPr>
-          <p:nvPr>
-            <p:ph type="title"/>
-          </p:nvPr>
-        </p:nvSpPr>
-        <p:spPr/>
-        <p:txBody>
-          <a:bodyPr/>
-          <a:lstStyle/>
-          <a:p>
-            <a:r>
-              <a:rPr lang="cs-CZ" dirty="0" err="1"/>
-              <a:t>Bussiness</a:t>
-            </a:r>
-            <a:r>
-              <a:rPr lang="cs-CZ" dirty="0"/>
-              <a:t> proces reklamace</a:t>
-            </a:r>
-          </a:p>
-        </p:txBody>
-      </p:sp>
+          <p:cNvPicPr>
+            <a:picLocks noGrp="1" noChangeAspect="1"/>
+          </p:cNvPicPr>
+          <p:nvPr>
+            <p:ph idx="1"/>
+          </p:nvPr>
+        </p:nvPicPr>
+        <p:blipFill>
+          <a:blip r:embed="rId2"/>
+          <a:stretch>
+            <a:fillRect/>
+          </a:stretch>
+        </p:blipFill>
+        <p:spPr>
+          <a:xfrm>
+            <a:off x="1491019" y="899238"/>
+            <a:ext cx="10363094" cy="5059524"/>
+          </a:xfrm>
+        </p:spPr>
+      </p:pic>
+    </p:spTree>
+    <p:extLst>
+      <p:ext uri="{BB962C8B-B14F-4D97-AF65-F5344CB8AC3E}">
+        <p14:creationId xmlns:p14="http://schemas.microsoft.com/office/powerpoint/2010/main" val="1961576229"/>
+      </p:ext>
+    </p:extLst>
+  </p:cSld>
+  <p:clrMapOvr>
+    <a:masterClrMapping/>
+  </p:clrMapOvr>
+</p:sld>
+</file>
+
+<file path=ppt/slides/slide11.xml><?xml version="1.0" encoding="utf-8"?>
+<p:sld xmlns:a="http://schemas.openxmlformats.org/drawingml/2006/main" xmlns:r="http://schemas.openxmlformats.org/officeDocument/2006/relationships" xmlns:p="http://schemas.openxmlformats.org/presentationml/2006/main">
+  <p:cSld>
+    <p:spTree>
+      <p:nvGrpSpPr>
+        <p:cNvPr id="1" name=""/>
+        <p:cNvGrpSpPr/>
+        <p:nvPr/>
+      </p:nvGrpSpPr>
+      <p:grpSpPr>
+        <a:xfrm>
+          <a:off x="0" y="0"/>
+          <a:ext cx="0" cy="0"/>
+          <a:chOff x="0" y="0"/>
+          <a:chExt cx="0" cy="0"/>
+        </a:xfrm>
+      </p:grpSpPr>
+      <p:pic>
+        <p:nvPicPr>
+          <p:cNvPr id="5" name="Zástupný obsah 4" descr="Obsah obrázku diagram, Technický výkres, Plán, text&#10;&#10;Popis byl vytvořen automaticky">
+            <a:extLst>
+              <a:ext uri="{FF2B5EF4-FFF2-40B4-BE49-F238E27FC236}">
+                <a16:creationId xmlns:a16="http://schemas.microsoft.com/office/drawing/2014/main" id="{ECC76E7B-7758-3EAD-3983-6561EEF008E9}"/>
+              </a:ext>
+            </a:extLst>
+          </p:cNvPr>
+          <p:cNvPicPr>
+            <a:picLocks noGrp="1" noChangeAspect="1"/>
+          </p:cNvPicPr>
+          <p:nvPr>
+            <p:ph idx="1"/>
+          </p:nvPr>
+        </p:nvPicPr>
+        <p:blipFill>
+          <a:blip r:embed="rId2"/>
+          <a:stretch>
+            <a:fillRect/>
+          </a:stretch>
+        </p:blipFill>
+        <p:spPr>
+          <a:xfrm>
+            <a:off x="1386217" y="1438698"/>
+            <a:ext cx="10678264" cy="4359804"/>
+          </a:xfrm>
+        </p:spPr>
+      </p:pic>
+    </p:spTree>
+    <p:extLst>
+      <p:ext uri="{BB962C8B-B14F-4D97-AF65-F5344CB8AC3E}">
+        <p14:creationId xmlns:p14="http://schemas.microsoft.com/office/powerpoint/2010/main" val="2639162902"/>
+      </p:ext>
+    </p:extLst>
+  </p:cSld>
+  <p:clrMapOvr>
+    <a:masterClrMapping/>
+  </p:clrMapOvr>
+</p:sld>
+</file>
+
+<file path=ppt/slides/slide12.xml><?xml version="1.0" encoding="utf-8"?>
+<p:sld xmlns:a="http://schemas.openxmlformats.org/drawingml/2006/main" xmlns:r="http://schemas.openxmlformats.org/officeDocument/2006/relationships" xmlns:p="http://schemas.openxmlformats.org/presentationml/2006/main">
+  <p:cSld>
+    <p:spTree>
+      <p:nvGrpSpPr>
+        <p:cNvPr id="1" name=""/>
+        <p:cNvGrpSpPr/>
+        <p:nvPr/>
+      </p:nvGrpSpPr>
+      <p:grpSpPr>
+        <a:xfrm>
+          <a:off x="0" y="0"/>
+          <a:ext cx="0" cy="0"/>
+          <a:chOff x="0" y="0"/>
+          <a:chExt cx="0" cy="0"/>
+        </a:xfrm>
+      </p:grpSpPr>
       <p:pic>
         <p:nvPicPr>
           <p:cNvPr id="5" name="Zástupný obsah 4" descr="Obsah obrázku text, diagram, skica, Technický výkres&#10;&#10;Popis byl vytvořen automaticky">
@@ -6838,8 +6927,8 @@
         </p:blipFill>
         <p:spPr>
           <a:xfrm>
-            <a:off x="2275023" y="1968026"/>
-            <a:ext cx="7641953" cy="4452652"/>
+            <a:off x="1827154" y="661865"/>
+            <a:ext cx="9498302" cy="5534270"/>
           </a:xfrm>
         </p:spPr>
       </p:pic>
@@ -6847,6 +6936,69 @@
     <p:extLst>
       <p:ext uri="{BB962C8B-B14F-4D97-AF65-F5344CB8AC3E}">
         <p14:creationId xmlns:p14="http://schemas.microsoft.com/office/powerpoint/2010/main" val="4294132301"/>
+      </p:ext>
+    </p:extLst>
+  </p:cSld>
+  <p:clrMapOvr>
+    <a:masterClrMapping/>
+  </p:clrMapOvr>
+</p:sld>
+</file>
+
+<file path=ppt/slides/slide13.xml><?xml version="1.0" encoding="utf-8"?>
+<p:sld xmlns:a="http://schemas.openxmlformats.org/drawingml/2006/main" xmlns:r="http://schemas.openxmlformats.org/officeDocument/2006/relationships" xmlns:p="http://schemas.openxmlformats.org/presentationml/2006/main">
+  <p:cSld>
+    <p:spTree>
+      <p:nvGrpSpPr>
+        <p:cNvPr id="1" name=""/>
+        <p:cNvGrpSpPr/>
+        <p:nvPr/>
+      </p:nvGrpSpPr>
+      <p:grpSpPr>
+        <a:xfrm>
+          <a:off x="0" y="0"/>
+          <a:ext cx="0" cy="0"/>
+          <a:chOff x="0" y="0"/>
+          <a:chExt cx="0" cy="0"/>
+        </a:xfrm>
+      </p:grpSpPr>
+      <p:sp>
+        <p:nvSpPr>
+          <p:cNvPr id="2" name="Nadpis 1">
+            <a:extLst>
+              <a:ext uri="{FF2B5EF4-FFF2-40B4-BE49-F238E27FC236}">
+                <a16:creationId xmlns:a16="http://schemas.microsoft.com/office/drawing/2014/main" id="{C8094DD7-0BB7-7770-F403-03A5B49507EC}"/>
+              </a:ext>
+            </a:extLst>
+          </p:cNvPr>
+          <p:cNvSpPr>
+            <a:spLocks noGrp="1"/>
+          </p:cNvSpPr>
+          <p:nvPr>
+            <p:ph type="title"/>
+          </p:nvPr>
+        </p:nvSpPr>
+        <p:spPr>
+          <a:xfrm>
+            <a:off x="1086643" y="2552700"/>
+            <a:ext cx="10018713" cy="1752599"/>
+          </a:xfrm>
+        </p:spPr>
+        <p:txBody>
+          <a:bodyPr/>
+          <a:lstStyle/>
+          <a:p>
+            <a:r>
+              <a:rPr lang="cs-CZ" dirty="0"/>
+              <a:t>Děkujeme za pozornost</a:t>
+            </a:r>
+          </a:p>
+        </p:txBody>
+      </p:sp>
+    </p:spTree>
+    <p:extLst>
+      <p:ext uri="{BB962C8B-B14F-4D97-AF65-F5344CB8AC3E}">
+        <p14:creationId xmlns:p14="http://schemas.microsoft.com/office/powerpoint/2010/main" val="1926994408"/>
       </p:ext>
     </p:extLst>
   </p:cSld>
@@ -7425,44 +7577,12 @@
           <a:chExt cx="0" cy="0"/>
         </a:xfrm>
       </p:grpSpPr>
-      <p:sp>
-        <p:nvSpPr>
-          <p:cNvPr id="2" name="Nadpis 1">
+      <p:pic>
+        <p:nvPicPr>
+          <p:cNvPr id="9" name="Zástupný obsah 8" descr="Obsah obrázku text, snímek obrazovky, Písmo, vizitka&#10;&#10;Popis byl vytvořen automaticky">
             <a:extLst>
               <a:ext uri="{FF2B5EF4-FFF2-40B4-BE49-F238E27FC236}">
-                <a16:creationId xmlns:a16="http://schemas.microsoft.com/office/drawing/2014/main" id="{F16DFC57-E892-2A6F-3D5E-D15215CDD046}"/>
-              </a:ext>
-            </a:extLst>
-          </p:cNvPr>
-          <p:cNvSpPr>
-            <a:spLocks noGrp="1"/>
-          </p:cNvSpPr>
-          <p:nvPr>
-            <p:ph type="title"/>
-          </p:nvPr>
-        </p:nvSpPr>
-        <p:spPr/>
-        <p:txBody>
-          <a:bodyPr/>
-          <a:lstStyle/>
-          <a:p>
-            <a:r>
-              <a:rPr lang="cs-CZ" dirty="0" err="1"/>
-              <a:t>Bussiness</a:t>
-            </a:r>
-            <a:r>
-              <a:rPr lang="cs-CZ" dirty="0"/>
-              <a:t> proces nákupu vozidel </a:t>
-            </a:r>
-          </a:p>
-        </p:txBody>
-      </p:sp>
-      <p:pic>
-        <p:nvPicPr>
-          <p:cNvPr id="5" name="Zástupný obsah 4" descr="Obsah obrázku text, diagram, Plán, řada/pruh&#10;&#10;Popis byl vytvořen automaticky">
-            <a:extLst>
-              <a:ext uri="{FF2B5EF4-FFF2-40B4-BE49-F238E27FC236}">
-                <a16:creationId xmlns:a16="http://schemas.microsoft.com/office/drawing/2014/main" id="{1D91F267-5ABE-1000-7870-6AA515B308AC}"/>
+                <a16:creationId xmlns:a16="http://schemas.microsoft.com/office/drawing/2014/main" id="{1D966652-601D-3267-4C96-71F83F2C51F8}"/>
               </a:ext>
             </a:extLst>
           </p:cNvPr>
@@ -7481,15 +7601,15 @@
         </p:blipFill>
         <p:spPr>
           <a:xfrm>
-            <a:off x="1798721" y="2068883"/>
-            <a:ext cx="9400395" cy="3974631"/>
+            <a:off x="1557532" y="1048966"/>
+            <a:ext cx="9953547" cy="4760067"/>
           </a:xfrm>
         </p:spPr>
       </p:pic>
     </p:spTree>
     <p:extLst>
       <p:ext uri="{BB962C8B-B14F-4D97-AF65-F5344CB8AC3E}">
-        <p14:creationId xmlns:p14="http://schemas.microsoft.com/office/powerpoint/2010/main" val="3902449360"/>
+        <p14:creationId xmlns:p14="http://schemas.microsoft.com/office/powerpoint/2010/main" val="1749865667"/>
       </p:ext>
     </p:extLst>
   </p:cSld>
@@ -7516,44 +7636,12 @@
           <a:chExt cx="0" cy="0"/>
         </a:xfrm>
       </p:grpSpPr>
-      <p:sp>
-        <p:nvSpPr>
-          <p:cNvPr id="2" name="Nadpis 1">
+      <p:pic>
+        <p:nvPicPr>
+          <p:cNvPr id="9" name="Zástupný obsah 8" descr="Obsah obrázku text, snímek obrazovky, Písmo&#10;&#10;Popis byl vytvořen automaticky">
             <a:extLst>
               <a:ext uri="{FF2B5EF4-FFF2-40B4-BE49-F238E27FC236}">
-                <a16:creationId xmlns:a16="http://schemas.microsoft.com/office/drawing/2014/main" id="{BE3162FB-82EC-6CA1-DED8-65ACA2E3D0AA}"/>
-              </a:ext>
-            </a:extLst>
-          </p:cNvPr>
-          <p:cNvSpPr>
-            <a:spLocks noGrp="1"/>
-          </p:cNvSpPr>
-          <p:nvPr>
-            <p:ph type="title"/>
-          </p:nvPr>
-        </p:nvSpPr>
-        <p:spPr/>
-        <p:txBody>
-          <a:bodyPr/>
-          <a:lstStyle/>
-          <a:p>
-            <a:r>
-              <a:rPr lang="cs-CZ" dirty="0" err="1"/>
-              <a:t>Bussiness</a:t>
-            </a:r>
-            <a:r>
-              <a:rPr lang="cs-CZ" dirty="0"/>
-              <a:t> proces rezervace</a:t>
-            </a:r>
-          </a:p>
-        </p:txBody>
-      </p:sp>
-      <p:pic>
-        <p:nvPicPr>
-          <p:cNvPr id="5" name="Zástupný obsah 4" descr="Obsah obrázku text, diagram, Technický výkres, Plán&#10;&#10;Popis byl vytvořen automaticky">
-            <a:extLst>
-              <a:ext uri="{FF2B5EF4-FFF2-40B4-BE49-F238E27FC236}">
-                <a16:creationId xmlns:a16="http://schemas.microsoft.com/office/drawing/2014/main" id="{71BAE5CC-93AA-38A0-3460-55DEC3747FE3}"/>
+                <a16:creationId xmlns:a16="http://schemas.microsoft.com/office/drawing/2014/main" id="{2CFC0F66-84CE-9931-E096-8117A68A7F6E}"/>
               </a:ext>
             </a:extLst>
           </p:cNvPr>
@@ -7572,15 +7660,15 @@
         </p:blipFill>
         <p:spPr>
           <a:xfrm>
-            <a:off x="1864244" y="2040100"/>
-            <a:ext cx="8463512" cy="4132100"/>
+            <a:off x="2746642" y="676883"/>
+            <a:ext cx="7172978" cy="5504234"/>
           </a:xfrm>
         </p:spPr>
       </p:pic>
     </p:spTree>
     <p:extLst>
       <p:ext uri="{BB962C8B-B14F-4D97-AF65-F5344CB8AC3E}">
-        <p14:creationId xmlns:p14="http://schemas.microsoft.com/office/powerpoint/2010/main" val="1961576229"/>
+        <p14:creationId xmlns:p14="http://schemas.microsoft.com/office/powerpoint/2010/main" val="2096921124"/>
       </p:ext>
     </p:extLst>
   </p:cSld>
@@ -7607,44 +7695,12 @@
           <a:chExt cx="0" cy="0"/>
         </a:xfrm>
       </p:grpSpPr>
-      <p:sp>
-        <p:nvSpPr>
-          <p:cNvPr id="2" name="Nadpis 1">
+      <p:pic>
+        <p:nvPicPr>
+          <p:cNvPr id="5" name="Zástupný obsah 4" descr="Obsah obrázku text, diagram, Plán, řada/pruh&#10;&#10;Popis byl vytvořen automaticky">
             <a:extLst>
               <a:ext uri="{FF2B5EF4-FFF2-40B4-BE49-F238E27FC236}">
-                <a16:creationId xmlns:a16="http://schemas.microsoft.com/office/drawing/2014/main" id="{BA2DD545-0F04-F8C4-E115-8F32408DBAD9}"/>
-              </a:ext>
-            </a:extLst>
-          </p:cNvPr>
-          <p:cNvSpPr>
-            <a:spLocks noGrp="1"/>
-          </p:cNvSpPr>
-          <p:nvPr>
-            <p:ph type="title"/>
-          </p:nvPr>
-        </p:nvSpPr>
-        <p:spPr/>
-        <p:txBody>
-          <a:bodyPr/>
-          <a:lstStyle/>
-          <a:p>
-            <a:r>
-              <a:rPr lang="cs-CZ" dirty="0" err="1"/>
-              <a:t>Bussiness</a:t>
-            </a:r>
-            <a:r>
-              <a:rPr lang="cs-CZ" dirty="0"/>
-              <a:t> proces vyzvednutí vozu</a:t>
-            </a:r>
-          </a:p>
-        </p:txBody>
-      </p:sp>
-      <p:pic>
-        <p:nvPicPr>
-          <p:cNvPr id="5" name="Zástupný obsah 4" descr="Obsah obrázku diagram, Technický výkres, Plán, text&#10;&#10;Popis byl vytvořen automaticky">
-            <a:extLst>
-              <a:ext uri="{FF2B5EF4-FFF2-40B4-BE49-F238E27FC236}">
-                <a16:creationId xmlns:a16="http://schemas.microsoft.com/office/drawing/2014/main" id="{ECC76E7B-7758-3EAD-3983-6561EEF008E9}"/>
+                <a16:creationId xmlns:a16="http://schemas.microsoft.com/office/drawing/2014/main" id="{1D91F267-5ABE-1000-7870-6AA515B308AC}"/>
               </a:ext>
             </a:extLst>
           </p:cNvPr>
@@ -7663,15 +7719,15 @@
         </p:blipFill>
         <p:spPr>
           <a:xfrm>
-            <a:off x="1712788" y="2060712"/>
-            <a:ext cx="9429031" cy="3849757"/>
+            <a:off x="1378842" y="1225324"/>
+            <a:ext cx="10423823" cy="4407352"/>
           </a:xfrm>
         </p:spPr>
       </p:pic>
     </p:spTree>
     <p:extLst>
       <p:ext uri="{BB962C8B-B14F-4D97-AF65-F5344CB8AC3E}">
-        <p14:creationId xmlns:p14="http://schemas.microsoft.com/office/powerpoint/2010/main" val="2639162902"/>
+        <p14:creationId xmlns:p14="http://schemas.microsoft.com/office/powerpoint/2010/main" val="3902449360"/>
       </p:ext>
     </p:extLst>
   </p:cSld>
@@ -8494,20 +8550,20 @@
 </file>
 
 <file path=customXml/item1.xml><?xml version="1.0" encoding="utf-8"?>
-<p:properties xmlns:p="http://schemas.microsoft.com/office/2006/metadata/properties" xmlns:xsi="http://www.w3.org/2001/XMLSchema-instance" xmlns:pc="http://schemas.microsoft.com/office/infopath/2007/PartnerControls">
-  <documentManagement>
-    <MediaServiceKeyPoints xmlns="71af3243-3dd4-4a8d-8c0d-dd76da1f02a5" xsi:nil="true"/>
-  </documentManagement>
-</p:properties>
-</file>
-
-<file path=customXml/item2.xml><?xml version="1.0" encoding="utf-8"?>
 <?mso-contentType ?>
 <FormTemplates xmlns="http://schemas.microsoft.com/sharepoint/v3/contenttype/forms">
   <Display>DocumentLibraryForm</Display>
   <Edit>DocumentLibraryForm</Edit>
   <New>DocumentLibraryForm</New>
 </FormTemplates>
+</file>
+
+<file path=customXml/item2.xml><?xml version="1.0" encoding="utf-8"?>
+<p:properties xmlns:p="http://schemas.microsoft.com/office/2006/metadata/properties" xmlns:xsi="http://www.w3.org/2001/XMLSchema-instance" xmlns:pc="http://schemas.microsoft.com/office/infopath/2007/PartnerControls">
+  <documentManagement>
+    <MediaServiceKeyPoints xmlns="71af3243-3dd4-4a8d-8c0d-dd76da1f02a5" xsi:nil="true"/>
+  </documentManagement>
+</p:properties>
 </file>
 
 <file path=customXml/item3.xml><?xml version="1.0" encoding="utf-8"?>
@@ -8722,19 +8778,19 @@
 </file>
 
 <file path=customXml/itemProps1.xml><?xml version="1.0" encoding="utf-8"?>
+<ds:datastoreItem xmlns:ds="http://schemas.openxmlformats.org/officeDocument/2006/customXml" ds:itemID="{33315AA3-EAE3-44ED-8368-BAC2FFFB4817}">
+  <ds:schemaRefs>
+    <ds:schemaRef ds:uri="http://schemas.microsoft.com/sharepoint/v3/contenttype/forms"/>
+  </ds:schemaRefs>
+</ds:datastoreItem>
+</file>
+
+<file path=customXml/itemProps2.xml><?xml version="1.0" encoding="utf-8"?>
 <ds:datastoreItem xmlns:ds="http://schemas.openxmlformats.org/officeDocument/2006/customXml" ds:itemID="{D7023227-530E-4024-91EF-312A851A758C}">
   <ds:schemaRefs>
     <ds:schemaRef ds:uri="http://schemas.microsoft.com/office/2006/metadata/properties"/>
     <ds:schemaRef ds:uri="http://schemas.microsoft.com/office/infopath/2007/PartnerControls"/>
     <ds:schemaRef ds:uri="71af3243-3dd4-4a8d-8c0d-dd76da1f02a5"/>
-  </ds:schemaRefs>
-</ds:datastoreItem>
-</file>
-
-<file path=customXml/itemProps2.xml><?xml version="1.0" encoding="utf-8"?>
-<ds:datastoreItem xmlns:ds="http://schemas.openxmlformats.org/officeDocument/2006/customXml" ds:itemID="{33315AA3-EAE3-44ED-8368-BAC2FFFB4817}">
-  <ds:schemaRefs>
-    <ds:schemaRef ds:uri="http://schemas.microsoft.com/sharepoint/v3/contenttype/forms"/>
   </ds:schemaRefs>
 </ds:datastoreItem>
 </file>

</xml_diff>

<commit_message>
Update prezentace - oprava
</commit_message>
<xml_diff>
--- a/Prezentace_pujcovna_aut.pptx
+++ b/Prezentace_pujcovna_aut.pptx
@@ -5,10 +5,10 @@
     <p:sldMasterId id="2147483648" r:id="rId4"/>
   </p:sldMasterIdLst>
   <p:notesMasterIdLst>
-    <p:notesMasterId r:id="rId18"/>
+    <p:notesMasterId r:id="rId19"/>
   </p:notesMasterIdLst>
   <p:handoutMasterIdLst>
-    <p:handoutMasterId r:id="rId19"/>
+    <p:handoutMasterId r:id="rId20"/>
   </p:handoutMasterIdLst>
   <p:sldIdLst>
     <p:sldId id="261" r:id="rId5"/>
@@ -22,8 +22,9 @@
     <p:sldId id="265" r:id="rId13"/>
     <p:sldId id="266" r:id="rId14"/>
     <p:sldId id="267" r:id="rId15"/>
-    <p:sldId id="268" r:id="rId16"/>
-    <p:sldId id="271" r:id="rId17"/>
+    <p:sldId id="274" r:id="rId16"/>
+    <p:sldId id="268" r:id="rId17"/>
+    <p:sldId id="271" r:id="rId18"/>
   </p:sldIdLst>
   <p:sldSz cx="12192000" cy="6858000"/>
   <p:notesSz cx="6858000" cy="9144000"/>
@@ -217,7 +218,7 @@
             <a:pPr rtl="0"/>
             <a:fld id="{A5E6EEE9-13F6-40ED-914F-030423CFA684}" type="datetime1">
               <a:rPr lang="cs-CZ" smtClean="0"/>
-              <a:t>28.04.2024</a:t>
+              <a:t>30.04.2024</a:t>
             </a:fld>
             <a:endParaRPr lang="cs-CZ" dirty="0"/>
           </a:p>
@@ -386,7 +387,7 @@
             <a:fld id="{1708A0FF-EF07-4E0E-80BD-A4A950917DEB}" type="datetime1">
               <a:rPr lang="cs-CZ" smtClean="0"/>
               <a:pPr/>
-              <a:t>28.04.2024</a:t>
+              <a:t>30.04.2024</a:t>
             </a:fld>
             <a:endParaRPr lang="cs-CZ" dirty="0"/>
           </a:p>
@@ -1161,7 +1162,7 @@
             <a:pPr rtl="0"/>
             <a:fld id="{60F3FC76-B9E1-4B0A-AC92-D5FDAC06C9CA}" type="datetime1">
               <a:rPr lang="cs-CZ" noProof="0" smtClean="0"/>
-              <a:t>28.04.2024</a:t>
+              <a:t>30.04.2024</a:t>
             </a:fld>
             <a:endParaRPr lang="cs-CZ" noProof="0" dirty="0"/>
           </a:p>
@@ -1458,7 +1459,7 @@
             <a:pPr rtl="0"/>
             <a:fld id="{3BE82174-4561-41EA-9F02-4C3DCC697793}" type="datetime1">
               <a:rPr lang="cs-CZ" noProof="0" smtClean="0"/>
-              <a:t>28.04.2024</a:t>
+              <a:t>30.04.2024</a:t>
             </a:fld>
             <a:endParaRPr lang="cs-CZ" noProof="0" dirty="0"/>
           </a:p>
@@ -1706,7 +1707,7 @@
             <a:pPr rtl="0"/>
             <a:fld id="{02F763C4-2CC7-4BB9-B410-F74C43A891C4}" type="datetime1">
               <a:rPr lang="cs-CZ" noProof="0" smtClean="0"/>
-              <a:t>28.04.2024</a:t>
+              <a:t>30.04.2024</a:t>
             </a:fld>
             <a:endParaRPr lang="cs-CZ" noProof="0" dirty="0"/>
           </a:p>
@@ -2246,7 +2247,7 @@
             <a:pPr rtl="0"/>
             <a:fld id="{417BE2A6-7865-412C-8B83-A45417093147}" type="datetime1">
               <a:rPr lang="cs-CZ" noProof="0" smtClean="0"/>
-              <a:t>28.04.2024</a:t>
+              <a:t>30.04.2024</a:t>
             </a:fld>
             <a:endParaRPr lang="cs-CZ" noProof="0" dirty="0"/>
           </a:p>
@@ -2494,7 +2495,7 @@
             <a:pPr rtl="0"/>
             <a:fld id="{674F72C5-9FCC-44D1-8204-7822C05A79D9}" type="datetime1">
               <a:rPr lang="cs-CZ" noProof="0" smtClean="0"/>
-              <a:t>28.04.2024</a:t>
+              <a:t>30.04.2024</a:t>
             </a:fld>
             <a:endParaRPr lang="cs-CZ" noProof="0" dirty="0"/>
           </a:p>
@@ -3026,7 +3027,7 @@
             <a:pPr rtl="0"/>
             <a:fld id="{0F962A8E-2547-4FC5-A954-A7F1F4C6C6EF}" type="datetime1">
               <a:rPr lang="cs-CZ" noProof="0" smtClean="0"/>
-              <a:t>28.04.2024</a:t>
+              <a:t>30.04.2024</a:t>
             </a:fld>
             <a:endParaRPr lang="cs-CZ" noProof="0" dirty="0"/>
           </a:p>
@@ -3322,7 +3323,7 @@
             <a:pPr rtl="0"/>
             <a:fld id="{36E159D8-4A5E-4758-BDBC-A0C764742BBD}" type="datetime1">
               <a:rPr lang="cs-CZ" noProof="0" smtClean="0"/>
-              <a:t>28.04.2024</a:t>
+              <a:t>30.04.2024</a:t>
             </a:fld>
             <a:endParaRPr lang="cs-CZ" noProof="0" dirty="0"/>
           </a:p>
@@ -3496,7 +3497,7 @@
             <a:pPr rtl="0"/>
             <a:fld id="{FCFABF75-0DF6-41ED-83BB-1ADC77868F9D}" type="datetime1">
               <a:rPr lang="cs-CZ" noProof="0" smtClean="0"/>
-              <a:t>28.04.2024</a:t>
+              <a:t>30.04.2024</a:t>
             </a:fld>
             <a:endParaRPr lang="cs-CZ" noProof="0" dirty="0"/>
           </a:p>
@@ -3676,7 +3677,7 @@
             <a:pPr rtl="0"/>
             <a:fld id="{25E4D6DA-0748-48AD-BB4E-D0899AC66DDA}" type="datetime1">
               <a:rPr lang="cs-CZ" noProof="0" smtClean="0"/>
-              <a:t>28.04.2024</a:t>
+              <a:t>30.04.2024</a:t>
             </a:fld>
             <a:endParaRPr lang="cs-CZ" noProof="0" dirty="0"/>
           </a:p>
@@ -3846,7 +3847,7 @@
             <a:pPr rtl="0"/>
             <a:fld id="{9CDE875C-2367-4FB8-881E-D8317E41B1EE}" type="datetime1">
               <a:rPr lang="cs-CZ" noProof="0" smtClean="0"/>
-              <a:t>28.04.2024</a:t>
+              <a:t>30.04.2024</a:t>
             </a:fld>
             <a:endParaRPr lang="cs-CZ" noProof="0" dirty="0"/>
           </a:p>
@@ -4097,7 +4098,7 @@
             <a:pPr rtl="0"/>
             <a:fld id="{55361CA0-66CA-4C74-89B9-9B9A6AE40107}" type="datetime1">
               <a:rPr lang="cs-CZ" noProof="0" smtClean="0"/>
-              <a:t>28.04.2024</a:t>
+              <a:t>30.04.2024</a:t>
             </a:fld>
             <a:endParaRPr lang="cs-CZ" noProof="0" dirty="0"/>
           </a:p>
@@ -4394,7 +4395,7 @@
             <a:pPr rtl="0"/>
             <a:fld id="{D21F0FDB-FA2C-43B4-A3A3-36EA1AD7695E}" type="datetime1">
               <a:rPr lang="cs-CZ" noProof="0" smtClean="0"/>
-              <a:t>28.04.2024</a:t>
+              <a:t>30.04.2024</a:t>
             </a:fld>
             <a:endParaRPr lang="cs-CZ" noProof="0" dirty="0"/>
           </a:p>
@@ -4836,7 +4837,7 @@
             <a:pPr rtl="0"/>
             <a:fld id="{0BDB886B-058A-4B28-8405-984F0FBA1A12}" type="datetime1">
               <a:rPr lang="cs-CZ" noProof="0" smtClean="0"/>
-              <a:t>28.04.2024</a:t>
+              <a:t>30.04.2024</a:t>
             </a:fld>
             <a:endParaRPr lang="cs-CZ" noProof="0" dirty="0"/>
           </a:p>
@@ -4954,7 +4955,7 @@
             <a:pPr rtl="0"/>
             <a:fld id="{755C478E-8365-451D-B5A1-381AC3D80635}" type="datetime1">
               <a:rPr lang="cs-CZ" noProof="0" smtClean="0"/>
-              <a:t>28.04.2024</a:t>
+              <a:t>30.04.2024</a:t>
             </a:fld>
             <a:endParaRPr lang="cs-CZ" noProof="0" dirty="0"/>
           </a:p>
@@ -5048,7 +5049,7 @@
             <a:pPr rtl="0"/>
             <a:fld id="{7157C8F2-BEDB-4EEA-8D43-FBCA00E261D0}" type="datetime1">
               <a:rPr lang="cs-CZ" noProof="0" smtClean="0"/>
-              <a:t>28.04.2024</a:t>
+              <a:t>30.04.2024</a:t>
             </a:fld>
             <a:endParaRPr lang="cs-CZ" noProof="0" dirty="0"/>
           </a:p>
@@ -5331,7 +5332,7 @@
             <a:pPr rtl="0"/>
             <a:fld id="{3D12E986-B109-4DC8-933F-F665794D144D}" type="datetime1">
               <a:rPr lang="cs-CZ" noProof="0" smtClean="0"/>
-              <a:t>28.04.2024</a:t>
+              <a:t>30.04.2024</a:t>
             </a:fld>
             <a:endParaRPr lang="cs-CZ" noProof="0" dirty="0"/>
           </a:p>
@@ -5623,7 +5624,7 @@
             <a:pPr rtl="0"/>
             <a:fld id="{87D1884C-521F-41E4-A3F5-52D84238A1BB}" type="datetime1">
               <a:rPr lang="cs-CZ" noProof="0" smtClean="0"/>
-              <a:t>28.04.2024</a:t>
+              <a:t>30.04.2024</a:t>
             </a:fld>
             <a:endParaRPr lang="cs-CZ" noProof="0" dirty="0"/>
           </a:p>
@@ -6151,7 +6152,7 @@
             <a:pPr rtl="0"/>
             <a:fld id="{B8C0DA42-23FD-4FA4-B9A5-AB0D779DB3E7}" type="datetime1">
               <a:rPr lang="cs-CZ" noProof="0" smtClean="0"/>
-              <a:t>28.04.2024</a:t>
+              <a:t>30.04.2024</a:t>
             </a:fld>
             <a:endParaRPr lang="cs-CZ" noProof="0" dirty="0"/>
           </a:p>
@@ -6787,10 +6788,10 @@
       </p:grpSpPr>
       <p:pic>
         <p:nvPicPr>
-          <p:cNvPr id="5" name="Zástupný obsah 4" descr="Obsah obrázku text, diagram, Technický výkres, Plán&#10;&#10;Popis byl vytvořen automaticky">
+          <p:cNvPr id="6" name="Zástupný obsah 5" descr="Obsah obrázku text, diagram, Technický výkres, Plán&#10;&#10;Popis byl vytvořen automaticky">
             <a:extLst>
               <a:ext uri="{FF2B5EF4-FFF2-40B4-BE49-F238E27FC236}">
-                <a16:creationId xmlns:a16="http://schemas.microsoft.com/office/drawing/2014/main" id="{71BAE5CC-93AA-38A0-3460-55DEC3747FE3}"/>
+                <a16:creationId xmlns:a16="http://schemas.microsoft.com/office/drawing/2014/main" id="{B3E550B7-EF02-48DA-C6A5-4EB5C36923FA}"/>
               </a:ext>
             </a:extLst>
           </p:cNvPr>
@@ -6809,8 +6810,8 @@
         </p:blipFill>
         <p:spPr>
           <a:xfrm>
-            <a:off x="1491019" y="899238"/>
-            <a:ext cx="10363094" cy="5059524"/>
+            <a:off x="1552043" y="778213"/>
+            <a:ext cx="10427174" cy="5090809"/>
           </a:xfrm>
         </p:spPr>
       </p:pic>
@@ -6905,6 +6906,65 @@
       </p:grpSpPr>
       <p:pic>
         <p:nvPicPr>
+          <p:cNvPr id="5" name="Zástupný obsah 4" descr="Obsah obrázku diagram, text, Technický výkres, Plán&#10;&#10;Popis byl vytvořen automaticky">
+            <a:extLst>
+              <a:ext uri="{FF2B5EF4-FFF2-40B4-BE49-F238E27FC236}">
+                <a16:creationId xmlns:a16="http://schemas.microsoft.com/office/drawing/2014/main" id="{7EDC2464-11AA-C92C-200B-580AA7FD5878}"/>
+              </a:ext>
+            </a:extLst>
+          </p:cNvPr>
+          <p:cNvPicPr>
+            <a:picLocks noGrp="1" noChangeAspect="1"/>
+          </p:cNvPicPr>
+          <p:nvPr>
+            <p:ph idx="1"/>
+          </p:nvPr>
+        </p:nvPicPr>
+        <p:blipFill>
+          <a:blip r:embed="rId2"/>
+          <a:stretch>
+            <a:fillRect/>
+          </a:stretch>
+        </p:blipFill>
+        <p:spPr>
+          <a:xfrm>
+            <a:off x="1293779" y="1147330"/>
+            <a:ext cx="10703668" cy="4705478"/>
+          </a:xfrm>
+        </p:spPr>
+      </p:pic>
+    </p:spTree>
+    <p:extLst>
+      <p:ext uri="{BB962C8B-B14F-4D97-AF65-F5344CB8AC3E}">
+        <p14:creationId xmlns:p14="http://schemas.microsoft.com/office/powerpoint/2010/main" val="3205752406"/>
+      </p:ext>
+    </p:extLst>
+  </p:cSld>
+  <p:clrMapOvr>
+    <a:masterClrMapping/>
+  </p:clrMapOvr>
+</p:sld>
+</file>
+
+<file path=ppt/slides/slide13.xml><?xml version="1.0" encoding="utf-8"?>
+<p:sld xmlns:a="http://schemas.openxmlformats.org/drawingml/2006/main" xmlns:r="http://schemas.openxmlformats.org/officeDocument/2006/relationships" xmlns:p="http://schemas.openxmlformats.org/presentationml/2006/main">
+  <p:cSld>
+    <p:spTree>
+      <p:nvGrpSpPr>
+        <p:cNvPr id="1" name=""/>
+        <p:cNvGrpSpPr/>
+        <p:nvPr/>
+      </p:nvGrpSpPr>
+      <p:grpSpPr>
+        <a:xfrm>
+          <a:off x="0" y="0"/>
+          <a:ext cx="0" cy="0"/>
+          <a:chOff x="0" y="0"/>
+          <a:chExt cx="0" cy="0"/>
+        </a:xfrm>
+      </p:grpSpPr>
+      <p:pic>
+        <p:nvPicPr>
           <p:cNvPr id="5" name="Zástupný obsah 4" descr="Obsah obrázku text, diagram, skica, Technický výkres&#10;&#10;Popis byl vytvořen automaticky">
             <a:extLst>
               <a:ext uri="{FF2B5EF4-FFF2-40B4-BE49-F238E27FC236}">
@@ -6945,7 +7005,7 @@
 </p:sld>
 </file>
 
-<file path=ppt/slides/slide13.xml><?xml version="1.0" encoding="utf-8"?>
+<file path=ppt/slides/slide14.xml><?xml version="1.0" encoding="utf-8"?>
 <p:sld xmlns:a="http://schemas.openxmlformats.org/drawingml/2006/main" xmlns:r="http://schemas.openxmlformats.org/officeDocument/2006/relationships" xmlns:p="http://schemas.openxmlformats.org/presentationml/2006/main">
   <p:cSld>
     <p:spTree>
@@ -8550,20 +8610,20 @@
 </file>
 
 <file path=customXml/item1.xml><?xml version="1.0" encoding="utf-8"?>
+<p:properties xmlns:p="http://schemas.microsoft.com/office/2006/metadata/properties" xmlns:xsi="http://www.w3.org/2001/XMLSchema-instance" xmlns:pc="http://schemas.microsoft.com/office/infopath/2007/PartnerControls">
+  <documentManagement>
+    <MediaServiceKeyPoints xmlns="71af3243-3dd4-4a8d-8c0d-dd76da1f02a5" xsi:nil="true"/>
+  </documentManagement>
+</p:properties>
+</file>
+
+<file path=customXml/item2.xml><?xml version="1.0" encoding="utf-8"?>
 <?mso-contentType ?>
 <FormTemplates xmlns="http://schemas.microsoft.com/sharepoint/v3/contenttype/forms">
   <Display>DocumentLibraryForm</Display>
   <Edit>DocumentLibraryForm</Edit>
   <New>DocumentLibraryForm</New>
 </FormTemplates>
-</file>
-
-<file path=customXml/item2.xml><?xml version="1.0" encoding="utf-8"?>
-<p:properties xmlns:p="http://schemas.microsoft.com/office/2006/metadata/properties" xmlns:xsi="http://www.w3.org/2001/XMLSchema-instance" xmlns:pc="http://schemas.microsoft.com/office/infopath/2007/PartnerControls">
-  <documentManagement>
-    <MediaServiceKeyPoints xmlns="71af3243-3dd4-4a8d-8c0d-dd76da1f02a5" xsi:nil="true"/>
-  </documentManagement>
-</p:properties>
 </file>
 
 <file path=customXml/item3.xml><?xml version="1.0" encoding="utf-8"?>
@@ -8778,19 +8838,19 @@
 </file>
 
 <file path=customXml/itemProps1.xml><?xml version="1.0" encoding="utf-8"?>
-<ds:datastoreItem xmlns:ds="http://schemas.openxmlformats.org/officeDocument/2006/customXml" ds:itemID="{33315AA3-EAE3-44ED-8368-BAC2FFFB4817}">
+<ds:datastoreItem xmlns:ds="http://schemas.openxmlformats.org/officeDocument/2006/customXml" ds:itemID="{D7023227-530E-4024-91EF-312A851A758C}">
   <ds:schemaRefs>
-    <ds:schemaRef ds:uri="http://schemas.microsoft.com/sharepoint/v3/contenttype/forms"/>
+    <ds:schemaRef ds:uri="http://schemas.microsoft.com/office/2006/metadata/properties"/>
+    <ds:schemaRef ds:uri="http://schemas.microsoft.com/office/infopath/2007/PartnerControls"/>
+    <ds:schemaRef ds:uri="71af3243-3dd4-4a8d-8c0d-dd76da1f02a5"/>
   </ds:schemaRefs>
 </ds:datastoreItem>
 </file>
 
 <file path=customXml/itemProps2.xml><?xml version="1.0" encoding="utf-8"?>
-<ds:datastoreItem xmlns:ds="http://schemas.openxmlformats.org/officeDocument/2006/customXml" ds:itemID="{D7023227-530E-4024-91EF-312A851A758C}">
+<ds:datastoreItem xmlns:ds="http://schemas.openxmlformats.org/officeDocument/2006/customXml" ds:itemID="{33315AA3-EAE3-44ED-8368-BAC2FFFB4817}">
   <ds:schemaRefs>
-    <ds:schemaRef ds:uri="http://schemas.microsoft.com/office/2006/metadata/properties"/>
-    <ds:schemaRef ds:uri="http://schemas.microsoft.com/office/infopath/2007/PartnerControls"/>
-    <ds:schemaRef ds:uri="71af3243-3dd4-4a8d-8c0d-dd76da1f02a5"/>
+    <ds:schemaRef ds:uri="http://schemas.microsoft.com/sharepoint/v3/contenttype/forms"/>
   </ds:schemaRefs>
 </ds:datastoreItem>
 </file>

</xml_diff>